<commit_message>
modified:   "Tropic-Island/\320\247\320\265\321\200\320\275\321\213\320\265 \320\264\321\213\321\200\321\213 \320\261\320\265\320\267 \320\260\320\275\320\270\320\274\320\260\321\206\320\270\320\270.pdf" 	modified:   "Tropic-Island/\320\247\320\265\321\200\320\275\321\213\320\265 \320\264\321\213\321\200\321\213 \320\261\320\265\320\267 \320\260\320\275\320\270\320\274\320\260\321\206\320\270\320\270.pptx" 	modified:   "Tropic-Island/\320\247\320\265\321\200\320\275\321\213\320\265 \320\264\321\213\321\200\321\213.pptx" 	new file:   "Tropic-Island/\320\277\321\200\320\265\320\267\320\260 \321\201 \321\204\320\273\320\265\321\210\320\272\320\270/\320\272\320\273\320\260\321\201\321\201\320\270\321\204\320\270\320\272\320\260\321\206\320\270\321\217 \321\207\320\265\321\200\320\275\321\213\321\205 \320\264\321\213\321\200.jpg" 	modified:   "Tropic-Island/\321\207\320\265\321\200\320\275\321\213\320\265 \320\264\321\213\321\200\321\213.pdf"
</commit_message>
<xml_diff>
--- a/Tropic-Island/Черные дыры без анимации.pptx
+++ b/Tropic-Island/Черные дыры без анимации.pptx
@@ -6,15 +6,16 @@
   </p:sldMasterIdLst>
   <p:sldIdLst>
     <p:sldId id="256" r:id="rId2"/>
-    <p:sldId id="257" r:id="rId3"/>
-    <p:sldId id="259" r:id="rId4"/>
-    <p:sldId id="258" r:id="rId5"/>
-    <p:sldId id="265" r:id="rId6"/>
-    <p:sldId id="264" r:id="rId7"/>
-    <p:sldId id="260" r:id="rId8"/>
-    <p:sldId id="261" r:id="rId9"/>
-    <p:sldId id="262" r:id="rId10"/>
-    <p:sldId id="263" r:id="rId11"/>
+    <p:sldId id="266" r:id="rId3"/>
+    <p:sldId id="257" r:id="rId4"/>
+    <p:sldId id="259" r:id="rId5"/>
+    <p:sldId id="258" r:id="rId6"/>
+    <p:sldId id="265" r:id="rId7"/>
+    <p:sldId id="264" r:id="rId8"/>
+    <p:sldId id="260" r:id="rId9"/>
+    <p:sldId id="261" r:id="rId10"/>
+    <p:sldId id="262" r:id="rId11"/>
+    <p:sldId id="263" r:id="rId12"/>
   </p:sldIdLst>
   <p:sldSz cx="9144000" cy="6858000" type="screen4x3"/>
   <p:notesSz cx="6858000" cy="9144000"/>
@@ -311,7 +312,7 @@
           <a:p>
             <a:fld id="{013A2C7F-9DC2-4944-A37F-907B713F9AFD}" type="datetimeFigureOut">
               <a:rPr lang="ru-RU" smtClean="0"/>
-              <a:t>04.05.2019</a:t>
+              <a:t>06.05.2019</a:t>
             </a:fld>
             <a:endParaRPr lang="ru-RU"/>
           </a:p>
@@ -474,7 +475,7 @@
           <a:p>
             <a:fld id="{013A2C7F-9DC2-4944-A37F-907B713F9AFD}" type="datetimeFigureOut">
               <a:rPr lang="ru-RU" smtClean="0"/>
-              <a:t>04.05.2019</a:t>
+              <a:t>06.05.2019</a:t>
             </a:fld>
             <a:endParaRPr lang="ru-RU"/>
           </a:p>
@@ -647,7 +648,7 @@
           <a:p>
             <a:fld id="{013A2C7F-9DC2-4944-A37F-907B713F9AFD}" type="datetimeFigureOut">
               <a:rPr lang="ru-RU" smtClean="0"/>
-              <a:t>04.05.2019</a:t>
+              <a:t>06.05.2019</a:t>
             </a:fld>
             <a:endParaRPr lang="ru-RU"/>
           </a:p>
@@ -810,7 +811,7 @@
           <a:p>
             <a:fld id="{013A2C7F-9DC2-4944-A37F-907B713F9AFD}" type="datetimeFigureOut">
               <a:rPr lang="ru-RU" smtClean="0"/>
-              <a:t>04.05.2019</a:t>
+              <a:t>06.05.2019</a:t>
             </a:fld>
             <a:endParaRPr lang="ru-RU"/>
           </a:p>
@@ -1050,7 +1051,7 @@
           <a:p>
             <a:fld id="{013A2C7F-9DC2-4944-A37F-907B713F9AFD}" type="datetimeFigureOut">
               <a:rPr lang="ru-RU" smtClean="0"/>
-              <a:t>04.05.2019</a:t>
+              <a:t>06.05.2019</a:t>
             </a:fld>
             <a:endParaRPr lang="ru-RU"/>
           </a:p>
@@ -1330,7 +1331,7 @@
           <a:p>
             <a:fld id="{013A2C7F-9DC2-4944-A37F-907B713F9AFD}" type="datetimeFigureOut">
               <a:rPr lang="ru-RU" smtClean="0"/>
-              <a:t>04.05.2019</a:t>
+              <a:t>06.05.2019</a:t>
             </a:fld>
             <a:endParaRPr lang="ru-RU"/>
           </a:p>
@@ -1744,7 +1745,7 @@
           <a:p>
             <a:fld id="{013A2C7F-9DC2-4944-A37F-907B713F9AFD}" type="datetimeFigureOut">
               <a:rPr lang="ru-RU" smtClean="0"/>
-              <a:t>04.05.2019</a:t>
+              <a:t>06.05.2019</a:t>
             </a:fld>
             <a:endParaRPr lang="ru-RU"/>
           </a:p>
@@ -1856,7 +1857,7 @@
           <a:p>
             <a:fld id="{013A2C7F-9DC2-4944-A37F-907B713F9AFD}" type="datetimeFigureOut">
               <a:rPr lang="ru-RU" smtClean="0"/>
-              <a:t>04.05.2019</a:t>
+              <a:t>06.05.2019</a:t>
             </a:fld>
             <a:endParaRPr lang="ru-RU"/>
           </a:p>
@@ -1946,7 +1947,7 @@
           <a:p>
             <a:fld id="{013A2C7F-9DC2-4944-A37F-907B713F9AFD}" type="datetimeFigureOut">
               <a:rPr lang="ru-RU" smtClean="0"/>
-              <a:t>04.05.2019</a:t>
+              <a:t>06.05.2019</a:t>
             </a:fld>
             <a:endParaRPr lang="ru-RU"/>
           </a:p>
@@ -2216,7 +2217,7 @@
           <a:p>
             <a:fld id="{013A2C7F-9DC2-4944-A37F-907B713F9AFD}" type="datetimeFigureOut">
               <a:rPr lang="ru-RU" smtClean="0"/>
-              <a:t>04.05.2019</a:t>
+              <a:t>06.05.2019</a:t>
             </a:fld>
             <a:endParaRPr lang="ru-RU"/>
           </a:p>
@@ -2463,7 +2464,7 @@
           <a:p>
             <a:fld id="{013A2C7F-9DC2-4944-A37F-907B713F9AFD}" type="datetimeFigureOut">
               <a:rPr lang="ru-RU" smtClean="0"/>
-              <a:t>04.05.2019</a:t>
+              <a:t>06.05.2019</a:t>
             </a:fld>
             <a:endParaRPr lang="ru-RU"/>
           </a:p>
@@ -2669,7 +2670,7 @@
           <a:p>
             <a:fld id="{013A2C7F-9DC2-4944-A37F-907B713F9AFD}" type="datetimeFigureOut">
               <a:rPr lang="ru-RU" smtClean="0"/>
-              <a:t>04.05.2019</a:t>
+              <a:t>06.05.2019</a:t>
             </a:fld>
             <a:endParaRPr lang="ru-RU"/>
           </a:p>
@@ -3123,6 +3124,73 @@
           <a:bodyPr/>
           <a:lstStyle/>
           <a:p>
+            <a:endParaRPr lang="ru-RU"/>
+          </a:p>
+        </p:txBody>
+      </p:sp>
+      <p:pic>
+        <p:nvPicPr>
+          <p:cNvPr id="4" name="Содержимое 3" descr="черная дыра последняя.png"/>
+          <p:cNvPicPr>
+            <a:picLocks noGrp="1" noChangeAspect="1"/>
+          </p:cNvPicPr>
+          <p:nvPr>
+            <p:ph idx="1"/>
+          </p:nvPr>
+        </p:nvPicPr>
+        <p:blipFill>
+          <a:blip r:embed="rId2" cstate="print"/>
+          <a:stretch>
+            <a:fillRect/>
+          </a:stretch>
+        </p:blipFill>
+        <p:spPr>
+          <a:xfrm>
+            <a:off x="0" y="0"/>
+            <a:ext cx="9144000" cy="6858000"/>
+          </a:xfrm>
+        </p:spPr>
+      </p:pic>
+    </p:spTree>
+  </p:cSld>
+  <p:clrMapOvr>
+    <a:masterClrMapping/>
+  </p:clrMapOvr>
+</p:sld>
+</file>
+
+<file path=ppt/slides/slide11.xml><?xml version="1.0" encoding="utf-8"?>
+<p:sld xmlns:a="http://schemas.openxmlformats.org/drawingml/2006/main" xmlns:r="http://schemas.openxmlformats.org/officeDocument/2006/relationships" xmlns:p="http://schemas.openxmlformats.org/presentationml/2006/main">
+  <p:cSld>
+    <p:spTree>
+      <p:nvGrpSpPr>
+        <p:cNvPr id="1" name=""/>
+        <p:cNvGrpSpPr/>
+        <p:nvPr/>
+      </p:nvGrpSpPr>
+      <p:grpSpPr>
+        <a:xfrm>
+          <a:off x="0" y="0"/>
+          <a:ext cx="0" cy="0"/>
+          <a:chOff x="0" y="0"/>
+          <a:chExt cx="0" cy="0"/>
+        </a:xfrm>
+      </p:grpSpPr>
+      <p:sp>
+        <p:nvSpPr>
+          <p:cNvPr id="2" name="Заголовок 1"/>
+          <p:cNvSpPr>
+            <a:spLocks noGrp="1"/>
+          </p:cNvSpPr>
+          <p:nvPr>
+            <p:ph type="title"/>
+          </p:nvPr>
+        </p:nvSpPr>
+        <p:spPr/>
+        <p:txBody>
+          <a:bodyPr/>
+          <a:lstStyle/>
+          <a:p>
             <a:r>
               <a:rPr lang="ru-RU" dirty="0"/>
               <a:t>Спасибо за внимание!</a:t>
@@ -3176,7 +3244,13 @@
       </p:grpSpPr>
       <p:sp>
         <p:nvSpPr>
-          <p:cNvPr id="2" name="Заголовок 1"/>
+          <p:cNvPr id="2" name="Заголовок 1">
+            <a:extLst>
+              <a:ext uri="{FF2B5EF4-FFF2-40B4-BE49-F238E27FC236}">
+                <a16:creationId xmlns:a16="http://schemas.microsoft.com/office/drawing/2014/main" id="{2E59366B-BA96-4685-90F9-B45639966668}"/>
+              </a:ext>
+            </a:extLst>
+          </p:cNvPr>
           <p:cNvSpPr>
             <a:spLocks noGrp="1"/>
           </p:cNvSpPr>
@@ -3195,7 +3269,13 @@
       </p:sp>
       <p:pic>
         <p:nvPicPr>
-          <p:cNvPr id="4" name="Содержимое 3" descr="образование черной дыры.jpg"/>
+          <p:cNvPr id="5" name="Объект 4">
+            <a:extLst>
+              <a:ext uri="{FF2B5EF4-FFF2-40B4-BE49-F238E27FC236}">
+                <a16:creationId xmlns:a16="http://schemas.microsoft.com/office/drawing/2014/main" id="{922B210E-6E2A-4F9B-AF18-7A8522B95690}"/>
+              </a:ext>
+            </a:extLst>
+          </p:cNvPr>
           <p:cNvPicPr>
             <a:picLocks noGrp="1" noChangeAspect="1"/>
           </p:cNvPicPr>
@@ -3204,19 +3284,30 @@
           </p:nvPr>
         </p:nvPicPr>
         <p:blipFill>
-          <a:blip r:embed="rId2" cstate="print"/>
+          <a:blip r:embed="rId2">
+            <a:extLst>
+              <a:ext uri="{28A0092B-C50C-407E-A947-70E740481C1C}">
+                <a14:useLocalDpi xmlns:a14="http://schemas.microsoft.com/office/drawing/2010/main" val="0"/>
+              </a:ext>
+            </a:extLst>
+          </a:blip>
           <a:stretch>
             <a:fillRect/>
           </a:stretch>
         </p:blipFill>
         <p:spPr>
           <a:xfrm>
-            <a:off x="0" y="0"/>
-            <a:ext cx="9144000" cy="6858001"/>
+            <a:off x="-8594" y="3873"/>
+            <a:ext cx="9152594" cy="6854127"/>
           </a:xfrm>
         </p:spPr>
       </p:pic>
     </p:spTree>
+    <p:extLst>
+      <p:ext uri="{BB962C8B-B14F-4D97-AF65-F5344CB8AC3E}">
+        <p14:creationId xmlns:p14="http://schemas.microsoft.com/office/powerpoint/2010/main" val="3470126056"/>
+      </p:ext>
+    </p:extLst>
   </p:cSld>
   <p:clrMapOvr>
     <a:masterClrMapping/>
@@ -3262,7 +3353,7 @@
       </p:sp>
       <p:pic>
         <p:nvPicPr>
-          <p:cNvPr id="4" name="Содержимое 3" descr="искривление пространства времени.jpg"/>
+          <p:cNvPr id="4" name="Содержимое 3" descr="образование черной дыры.jpg"/>
           <p:cNvPicPr>
             <a:picLocks noGrp="1" noChangeAspect="1"/>
           </p:cNvPicPr>
@@ -3279,7 +3370,7 @@
         <p:spPr>
           <a:xfrm>
             <a:off x="0" y="0"/>
-            <a:ext cx="9144000" cy="6800359"/>
+            <a:ext cx="9144000" cy="6858001"/>
           </a:xfrm>
         </p:spPr>
       </p:pic>
@@ -3329,6 +3420,73 @@
       </p:sp>
       <p:pic>
         <p:nvPicPr>
+          <p:cNvPr id="4" name="Содержимое 3" descr="искривление пространства времени.jpg"/>
+          <p:cNvPicPr>
+            <a:picLocks noGrp="1" noChangeAspect="1"/>
+          </p:cNvPicPr>
+          <p:nvPr>
+            <p:ph idx="1"/>
+          </p:nvPr>
+        </p:nvPicPr>
+        <p:blipFill>
+          <a:blip r:embed="rId2" cstate="print"/>
+          <a:stretch>
+            <a:fillRect/>
+          </a:stretch>
+        </p:blipFill>
+        <p:spPr>
+          <a:xfrm>
+            <a:off x="0" y="0"/>
+            <a:ext cx="9144000" cy="6800359"/>
+          </a:xfrm>
+        </p:spPr>
+      </p:pic>
+    </p:spTree>
+  </p:cSld>
+  <p:clrMapOvr>
+    <a:masterClrMapping/>
+  </p:clrMapOvr>
+</p:sld>
+</file>
+
+<file path=ppt/slides/slide5.xml><?xml version="1.0" encoding="utf-8"?>
+<p:sld xmlns:a="http://schemas.openxmlformats.org/drawingml/2006/main" xmlns:r="http://schemas.openxmlformats.org/officeDocument/2006/relationships" xmlns:p="http://schemas.openxmlformats.org/presentationml/2006/main">
+  <p:cSld>
+    <p:spTree>
+      <p:nvGrpSpPr>
+        <p:cNvPr id="1" name=""/>
+        <p:cNvGrpSpPr/>
+        <p:nvPr/>
+      </p:nvGrpSpPr>
+      <p:grpSpPr>
+        <a:xfrm>
+          <a:off x="0" y="0"/>
+          <a:ext cx="0" cy="0"/>
+          <a:chOff x="0" y="0"/>
+          <a:chExt cx="0" cy="0"/>
+        </a:xfrm>
+      </p:grpSpPr>
+      <p:sp>
+        <p:nvSpPr>
+          <p:cNvPr id="2" name="Заголовок 1"/>
+          <p:cNvSpPr>
+            <a:spLocks noGrp="1"/>
+          </p:cNvSpPr>
+          <p:nvPr>
+            <p:ph type="title"/>
+          </p:nvPr>
+        </p:nvSpPr>
+        <p:spPr/>
+        <p:txBody>
+          <a:bodyPr/>
+          <a:lstStyle/>
+          <a:p>
+            <a:endParaRPr lang="ru-RU"/>
+          </a:p>
+        </p:txBody>
+      </p:sp>
+      <p:pic>
+        <p:nvPicPr>
           <p:cNvPr id="4" name="Содержимое 3" descr="структура черной дыры.jpg"/>
           <p:cNvPicPr>
             <a:picLocks noGrp="1" noChangeAspect="1"/>
@@ -3358,7 +3516,7 @@
 </p:sld>
 </file>
 
-<file path=ppt/slides/slide5.xml><?xml version="1.0" encoding="utf-8"?>
+<file path=ppt/slides/slide6.xml><?xml version="1.0" encoding="utf-8"?>
 <p:sld xmlns:a="http://schemas.openxmlformats.org/drawingml/2006/main" xmlns:r="http://schemas.openxmlformats.org/officeDocument/2006/relationships" xmlns:p="http://schemas.openxmlformats.org/presentationml/2006/main">
   <p:cSld>
     <p:spTree>
@@ -3448,7 +3606,7 @@
 </p:sld>
 </file>
 
-<file path=ppt/slides/slide6.xml><?xml version="1.0" encoding="utf-8"?>
+<file path=ppt/slides/slide7.xml><?xml version="1.0" encoding="utf-8"?>
 <p:sld xmlns:a="http://schemas.openxmlformats.org/drawingml/2006/main" xmlns:r="http://schemas.openxmlformats.org/officeDocument/2006/relationships" xmlns:p="http://schemas.openxmlformats.org/presentationml/2006/main">
   <p:cSld>
     <p:spTree>
@@ -3538,73 +3696,6 @@
 </p:sld>
 </file>
 
-<file path=ppt/slides/slide7.xml><?xml version="1.0" encoding="utf-8"?>
-<p:sld xmlns:a="http://schemas.openxmlformats.org/drawingml/2006/main" xmlns:r="http://schemas.openxmlformats.org/officeDocument/2006/relationships" xmlns:p="http://schemas.openxmlformats.org/presentationml/2006/main">
-  <p:cSld>
-    <p:spTree>
-      <p:nvGrpSpPr>
-        <p:cNvPr id="1" name=""/>
-        <p:cNvGrpSpPr/>
-        <p:nvPr/>
-      </p:nvGrpSpPr>
-      <p:grpSpPr>
-        <a:xfrm>
-          <a:off x="0" y="0"/>
-          <a:ext cx="0" cy="0"/>
-          <a:chOff x="0" y="0"/>
-          <a:chExt cx="0" cy="0"/>
-        </a:xfrm>
-      </p:grpSpPr>
-      <p:sp>
-        <p:nvSpPr>
-          <p:cNvPr id="2" name="Заголовок 1"/>
-          <p:cNvSpPr>
-            <a:spLocks noGrp="1"/>
-          </p:cNvSpPr>
-          <p:nvPr>
-            <p:ph type="title"/>
-          </p:nvPr>
-        </p:nvSpPr>
-        <p:spPr/>
-        <p:txBody>
-          <a:bodyPr/>
-          <a:lstStyle/>
-          <a:p>
-            <a:endParaRPr lang="ru-RU"/>
-          </a:p>
-        </p:txBody>
-      </p:sp>
-      <p:pic>
-        <p:nvPicPr>
-          <p:cNvPr id="4" name="Содержимое 3" descr="черная дыра поглощает звезду.jpg"/>
-          <p:cNvPicPr>
-            <a:picLocks noGrp="1" noChangeAspect="1"/>
-          </p:cNvPicPr>
-          <p:nvPr>
-            <p:ph idx="1"/>
-          </p:nvPr>
-        </p:nvPicPr>
-        <p:blipFill>
-          <a:blip r:embed="rId2" cstate="print"/>
-          <a:stretch>
-            <a:fillRect/>
-          </a:stretch>
-        </p:blipFill>
-        <p:spPr>
-          <a:xfrm>
-            <a:off x="0" y="0"/>
-            <a:ext cx="9139945" cy="6858000"/>
-          </a:xfrm>
-        </p:spPr>
-      </p:pic>
-    </p:spTree>
-  </p:cSld>
-  <p:clrMapOvr>
-    <a:masterClrMapping/>
-  </p:clrMapOvr>
-</p:sld>
-</file>
-
 <file path=ppt/slides/slide8.xml><?xml version="1.0" encoding="utf-8"?>
 <p:sld xmlns:a="http://schemas.openxmlformats.org/drawingml/2006/main" xmlns:r="http://schemas.openxmlformats.org/officeDocument/2006/relationships" xmlns:p="http://schemas.openxmlformats.org/presentationml/2006/main">
   <p:cSld>
@@ -3643,7 +3734,7 @@
       </p:sp>
       <p:pic>
         <p:nvPicPr>
-          <p:cNvPr id="4" name="Содержимое 3" descr="черная дыра интерстеллар.jpg"/>
+          <p:cNvPr id="4" name="Содержимое 3" descr="черная дыра поглощает звезду.jpg"/>
           <p:cNvPicPr>
             <a:picLocks noGrp="1" noChangeAspect="1"/>
           </p:cNvPicPr>
@@ -3660,7 +3751,7 @@
         <p:spPr>
           <a:xfrm>
             <a:off x="0" y="0"/>
-            <a:ext cx="9144000" cy="6858000"/>
+            <a:ext cx="9139945" cy="6858000"/>
           </a:xfrm>
         </p:spPr>
       </p:pic>
@@ -3710,7 +3801,7 @@
       </p:sp>
       <p:pic>
         <p:nvPicPr>
-          <p:cNvPr id="4" name="Содержимое 3" descr="черная дыра последняя.png"/>
+          <p:cNvPr id="4" name="Содержимое 3" descr="черная дыра интерстеллар.jpg"/>
           <p:cNvPicPr>
             <a:picLocks noGrp="1" noChangeAspect="1"/>
           </p:cNvPicPr>

</xml_diff>